<commit_message>
Update solution explanation and jar file.
</commit_message>
<xml_diff>
--- a/assignment2/akka_solution_explanation.pptx
+++ b/assignment2/akka_solution_explanation.pptx
@@ -6347,8 +6347,8 @@
         </p:nvSpPr>
         <p:spPr>
           <a:xfrm>
-            <a:off x="3441075" y="4324693"/>
-            <a:ext cx="2380800" cy="508500"/>
+            <a:off x="3091925" y="4324700"/>
+            <a:ext cx="2961000" cy="508500"/>
           </a:xfrm>
           <a:prstGeom prst="rect">
             <a:avLst/>
@@ -6375,7 +6375,7 @@
             </a:pPr>
             <a:r>
               <a:rPr i="1" lang="de" sz="1200"/>
-              <a:t>Divide Byte Array in chunks and send it in batches</a:t>
+              <a:t>Divide Byte Array in chunks and send one chunk at a time, waiting for the receiver’s acknowledge</a:t>
             </a:r>
             <a:endParaRPr i="1" sz="1200"/>
           </a:p>

</xml_diff>